<commit_message>
JavaScript 1 presentation fix
</commit_message>
<xml_diff>
--- a/JavaScript 1/JavaScriptIntro.pptx
+++ b/JavaScript 1/JavaScriptIntro.pptx
@@ -9089,7 +9089,7 @@
           </a:prstGeom>
           <a:noFill/>
           <a:extLst>
-            <a:ext uri="{909E8E84-426E-40dd-AFC4-6F175D3DCCD1}">
+            <a:ext uri="{909E8E84-426E-40DD-AFC4-6F175D3DCCD1}">
               <a14:hiddenFill xmlns:a14="http://schemas.microsoft.com/office/drawing/2010/main">
                 <a:solidFill>
                   <a:srgbClr val="FFFFFF"/>
@@ -9368,7 +9368,7 @@
   <p:timing>
     <p:tnLst>
       <p:par>
-        <p:cTn xmlns:p14="http://schemas.microsoft.com/office/powerpoint/2010/main" id="1" dur="indefinite" restart="never" nodeType="tmRoot"/>
+        <p:cTn id="1" dur="indefinite" restart="never" nodeType="tmRoot"/>
       </p:par>
     </p:tnLst>
   </p:timing>
@@ -9586,11 +9586,11 @@
   <p:clrMapOvr>
     <a:masterClrMapping/>
   </p:clrMapOvr>
-  <p:transition xmlns:p14="http://schemas.microsoft.com/office/powerpoint/2010/main" spd="med"/>
+  <p:transition spd="med"/>
   <p:timing>
     <p:tnLst>
       <p:par>
-        <p:cTn xmlns:p14="http://schemas.microsoft.com/office/powerpoint/2010/main" id="1" dur="indefinite" restart="never" nodeType="tmRoot">
+        <p:cTn id="1" dur="indefinite" restart="never" nodeType="tmRoot">
           <p:childTnLst>
             <p:seq concurrent="1" nextAc="seek">
               <p:cTn id="2" dur="indefinite" nodeType="mainSeq">
@@ -10227,7 +10227,7 @@
           </a:prstGeom>
           <a:noFill/>
           <a:extLst>
-            <a:ext uri="{909E8E84-426E-40dd-AFC4-6F175D3DCCD1}">
+            <a:ext uri="{909E8E84-426E-40DD-AFC4-6F175D3DCCD1}">
               <a14:hiddenFill xmlns:a14="http://schemas.microsoft.com/office/drawing/2010/main">
                 <a:solidFill>
                   <a:srgbClr val="FFFFFF"/>
@@ -10268,7 +10268,7 @@
           </a:prstGeom>
           <a:noFill/>
           <a:extLst>
-            <a:ext uri="{909E8E84-426E-40dd-AFC4-6F175D3DCCD1}">
+            <a:ext uri="{909E8E84-426E-40DD-AFC4-6F175D3DCCD1}">
               <a14:hiddenFill xmlns:a14="http://schemas.microsoft.com/office/drawing/2010/main">
                 <a:solidFill>
                   <a:srgbClr val="FFFFFF"/>
@@ -10309,7 +10309,7 @@
           </a:prstGeom>
           <a:noFill/>
           <a:extLst>
-            <a:ext uri="{909E8E84-426E-40dd-AFC4-6F175D3DCCD1}">
+            <a:ext uri="{909E8E84-426E-40DD-AFC4-6F175D3DCCD1}">
               <a14:hiddenFill xmlns:a14="http://schemas.microsoft.com/office/drawing/2010/main">
                 <a:solidFill>
                   <a:srgbClr val="FFFFFF"/>
@@ -10329,11 +10329,11 @@
   <p:clrMapOvr>
     <a:masterClrMapping/>
   </p:clrMapOvr>
-  <p:transition xmlns:p14="http://schemas.microsoft.com/office/powerpoint/2010/main" spd="med"/>
+  <p:transition spd="med"/>
   <p:timing>
     <p:tnLst>
       <p:par>
-        <p:cTn xmlns:p14="http://schemas.microsoft.com/office/powerpoint/2010/main" id="1" dur="indefinite" restart="never" nodeType="tmRoot">
+        <p:cTn id="1" dur="indefinite" restart="never" nodeType="tmRoot">
           <p:childTnLst>
             <p:seq concurrent="1" nextAc="seek">
               <p:cTn id="2" dur="indefinite" nodeType="mainSeq">
@@ -10979,7 +10979,7 @@
           </a:prstGeom>
           <a:noFill/>
           <a:extLst>
-            <a:ext uri="{909E8E84-426E-40dd-AFC4-6F175D3DCCD1}">
+            <a:ext uri="{909E8E84-426E-40DD-AFC4-6F175D3DCCD1}">
               <a14:hiddenFill xmlns:a14="http://schemas.microsoft.com/office/drawing/2010/main">
                 <a:solidFill>
                   <a:srgbClr val="FFFFFF"/>
@@ -10999,11 +10999,11 @@
   <p:clrMapOvr>
     <a:masterClrMapping/>
   </p:clrMapOvr>
-  <p:transition xmlns:p14="http://schemas.microsoft.com/office/powerpoint/2010/main" spd="med"/>
+  <p:transition spd="med"/>
   <p:timing>
     <p:tnLst>
       <p:par>
-        <p:cTn xmlns:p14="http://schemas.microsoft.com/office/powerpoint/2010/main" id="1" dur="indefinite" restart="never" nodeType="tmRoot">
+        <p:cTn id="1" dur="indefinite" restart="never" nodeType="tmRoot">
           <p:childTnLst>
             <p:seq concurrent="1" nextAc="seek">
               <p:cTn id="2" dur="indefinite" nodeType="mainSeq">
@@ -11616,7 +11616,7 @@
           </a:prstGeom>
           <a:noFill/>
           <a:extLst>
-            <a:ext uri="{909E8E84-426E-40dd-AFC4-6F175D3DCCD1}">
+            <a:ext uri="{909E8E84-426E-40DD-AFC4-6F175D3DCCD1}">
               <a14:hiddenFill xmlns:a14="http://schemas.microsoft.com/office/drawing/2010/main">
                 <a:solidFill>
                   <a:srgbClr val="FFFFFF"/>
@@ -11879,7 +11879,48 @@
           </a:prstGeom>
           <a:noFill/>
           <a:extLst>
-            <a:ext uri="{909E8E84-426E-40dd-AFC4-6F175D3DCCD1}">
+            <a:ext uri="{909E8E84-426E-40DD-AFC4-6F175D3DCCD1}">
+              <a14:hiddenFill xmlns:a14="http://schemas.microsoft.com/office/drawing/2010/main">
+                <a:solidFill>
+                  <a:srgbClr val="FFFFFF"/>
+                </a:solidFill>
+              </a14:hiddenFill>
+            </a:ext>
+          </a:extLst>
+        </p:spPr>
+      </p:pic>
+      <p:pic>
+        <p:nvPicPr>
+          <p:cNvPr id="9" name="Picture 5" descr="C:\Users\i309691\Downloads\equipmentprotection3.png"/>
+          <p:cNvPicPr>
+            <a:picLocks noChangeAspect="1" noChangeArrowheads="1"/>
+          </p:cNvPicPr>
+          <p:nvPr/>
+        </p:nvPicPr>
+        <p:blipFill>
+          <a:blip r:embed="rId6" cstate="print">
+            <a:extLst>
+              <a:ext uri="{28A0092B-C50C-407E-A947-70E740481C1C}">
+                <a14:useLocalDpi xmlns:a14="http://schemas.microsoft.com/office/drawing/2010/main" val="0"/>
+              </a:ext>
+            </a:extLst>
+          </a:blip>
+          <a:srcRect/>
+          <a:stretch>
+            <a:fillRect/>
+          </a:stretch>
+        </p:blipFill>
+        <p:spPr bwMode="auto">
+          <a:xfrm>
+            <a:off x="523326" y="334752"/>
+            <a:ext cx="1639874" cy="1639874"/>
+          </a:xfrm>
+          <a:prstGeom prst="rect">
+            <a:avLst/>
+          </a:prstGeom>
+          <a:noFill/>
+          <a:extLst>
+            <a:ext uri="{909E8E84-426E-40DD-AFC4-6F175D3DCCD1}">
               <a14:hiddenFill xmlns:a14="http://schemas.microsoft.com/office/drawing/2010/main">
                 <a:solidFill>
                   <a:srgbClr val="FFFFFF"/>
@@ -11902,7 +11943,7 @@
   <p:timing>
     <p:tnLst>
       <p:par>
-        <p:cTn xmlns:p14="http://schemas.microsoft.com/office/powerpoint/2010/main" id="1" dur="indefinite" restart="never" nodeType="tmRoot"/>
+        <p:cTn id="1" dur="indefinite" restart="never" nodeType="tmRoot"/>
       </p:par>
     </p:tnLst>
   </p:timing>
@@ -12080,7 +12121,48 @@
           </a:prstGeom>
           <a:noFill/>
           <a:extLst>
-            <a:ext uri="{909E8E84-426E-40dd-AFC4-6F175D3DCCD1}">
+            <a:ext uri="{909E8E84-426E-40DD-AFC4-6F175D3DCCD1}">
+              <a14:hiddenFill xmlns:a14="http://schemas.microsoft.com/office/drawing/2010/main">
+                <a:solidFill>
+                  <a:srgbClr val="FFFFFF"/>
+                </a:solidFill>
+              </a14:hiddenFill>
+            </a:ext>
+          </a:extLst>
+        </p:spPr>
+      </p:pic>
+      <p:pic>
+        <p:nvPicPr>
+          <p:cNvPr id="9218" name="Picture 2" descr="http://designshack.co.uk/wp-content/uploads/prog101-2.jpg"/>
+          <p:cNvPicPr>
+            <a:picLocks noChangeAspect="1" noChangeArrowheads="1"/>
+          </p:cNvPicPr>
+          <p:nvPr/>
+        </p:nvPicPr>
+        <p:blipFill>
+          <a:blip r:embed="rId3">
+            <a:extLst>
+              <a:ext uri="{28A0092B-C50C-407E-A947-70E740481C1C}">
+                <a14:useLocalDpi xmlns:a14="http://schemas.microsoft.com/office/drawing/2010/main" val="0"/>
+              </a:ext>
+            </a:extLst>
+          </a:blip>
+          <a:srcRect/>
+          <a:stretch>
+            <a:fillRect/>
+          </a:stretch>
+        </p:blipFill>
+        <p:spPr bwMode="auto">
+          <a:xfrm>
+            <a:off x="3027245" y="3086349"/>
+            <a:ext cx="4857750" cy="2952751"/>
+          </a:xfrm>
+          <a:prstGeom prst="rect">
+            <a:avLst/>
+          </a:prstGeom>
+          <a:noFill/>
+          <a:extLst>
+            <a:ext uri="{909E8E84-426E-40DD-AFC4-6F175D3DCCD1}">
               <a14:hiddenFill xmlns:a14="http://schemas.microsoft.com/office/drawing/2010/main">
                 <a:solidFill>
                   <a:srgbClr val="FFFFFF"/>
@@ -12103,7 +12185,7 @@
   <p:timing>
     <p:tnLst>
       <p:par>
-        <p:cTn xmlns:p14="http://schemas.microsoft.com/office/powerpoint/2010/main" id="1" dur="indefinite" restart="never" nodeType="tmRoot"/>
+        <p:cTn id="1" dur="indefinite" restart="never" nodeType="tmRoot"/>
       </p:par>
     </p:tnLst>
   </p:timing>
@@ -13207,11 +13289,11 @@
   <p:clrMapOvr>
     <a:masterClrMapping/>
   </p:clrMapOvr>
-  <p:transition xmlns:p14="http://schemas.microsoft.com/office/powerpoint/2010/main" spd="med"/>
+  <p:transition spd="med"/>
   <p:timing>
     <p:tnLst>
       <p:par>
-        <p:cTn xmlns:p14="http://schemas.microsoft.com/office/powerpoint/2010/main" id="1" dur="indefinite" restart="never" nodeType="tmRoot">
+        <p:cTn id="1" dur="indefinite" restart="never" nodeType="tmRoot">
           <p:childTnLst>
             <p:seq concurrent="1" nextAc="seek">
               <p:cTn id="2" dur="indefinite" nodeType="mainSeq">
@@ -14269,7 +14351,7 @@
           </a:prstGeom>
           <a:noFill/>
           <a:extLst>
-            <a:ext uri="{909E8E84-426E-40dd-AFC4-6F175D3DCCD1}">
+            <a:ext uri="{909E8E84-426E-40DD-AFC4-6F175D3DCCD1}">
               <a14:hiddenFill xmlns:a14="http://schemas.microsoft.com/office/drawing/2010/main">
                 <a:solidFill>
                   <a:srgbClr val="FFFFFF"/>
@@ -14310,7 +14392,7 @@
           </a:prstGeom>
           <a:noFill/>
           <a:extLst>
-            <a:ext uri="{909E8E84-426E-40dd-AFC4-6F175D3DCCD1}">
+            <a:ext uri="{909E8E84-426E-40DD-AFC4-6F175D3DCCD1}">
               <a14:hiddenFill xmlns:a14="http://schemas.microsoft.com/office/drawing/2010/main">
                 <a:solidFill>
                   <a:srgbClr val="FFFFFF"/>
@@ -14351,7 +14433,7 @@
           </a:prstGeom>
           <a:noFill/>
           <a:extLst>
-            <a:ext uri="{909E8E84-426E-40dd-AFC4-6F175D3DCCD1}">
+            <a:ext uri="{909E8E84-426E-40DD-AFC4-6F175D3DCCD1}">
               <a14:hiddenFill xmlns:a14="http://schemas.microsoft.com/office/drawing/2010/main">
                 <a:solidFill>
                   <a:srgbClr val="FFFFFF"/>
@@ -14392,7 +14474,7 @@
           </a:prstGeom>
           <a:noFill/>
           <a:extLst>
-            <a:ext uri="{909E8E84-426E-40dd-AFC4-6F175D3DCCD1}">
+            <a:ext uri="{909E8E84-426E-40DD-AFC4-6F175D3DCCD1}">
               <a14:hiddenFill xmlns:a14="http://schemas.microsoft.com/office/drawing/2010/main">
                 <a:solidFill>
                   <a:srgbClr val="FFFFFF"/>
@@ -14412,11 +14494,11 @@
   <p:clrMapOvr>
     <a:masterClrMapping/>
   </p:clrMapOvr>
-  <p:transition xmlns:p14="http://schemas.microsoft.com/office/powerpoint/2010/main" spd="med"/>
+  <p:transition spd="med"/>
   <p:timing>
     <p:tnLst>
       <p:par>
-        <p:cTn xmlns:p14="http://schemas.microsoft.com/office/powerpoint/2010/main" id="1" dur="indefinite" restart="never" nodeType="tmRoot">
+        <p:cTn id="1" dur="indefinite" restart="never" nodeType="tmRoot">
           <p:childTnLst>
             <p:seq concurrent="1" nextAc="seek">
               <p:cTn id="2" dur="indefinite" nodeType="mainSeq">
@@ -15036,11 +15118,11 @@
   <p:clrMapOvr>
     <a:masterClrMapping/>
   </p:clrMapOvr>
-  <p:transition xmlns:p14="http://schemas.microsoft.com/office/powerpoint/2010/main" spd="med"/>
+  <p:transition spd="med"/>
   <p:timing>
     <p:tnLst>
       <p:par>
-        <p:cTn xmlns:p14="http://schemas.microsoft.com/office/powerpoint/2010/main" id="1" dur="indefinite" restart="never" nodeType="tmRoot">
+        <p:cTn id="1" dur="indefinite" restart="never" nodeType="tmRoot">
           <p:childTnLst>
             <p:seq concurrent="1" nextAc="seek">
               <p:cTn id="2" dur="indefinite" nodeType="mainSeq">
@@ -15360,7 +15442,7 @@
           </a:prstGeom>
           <a:noFill/>
           <a:extLst>
-            <a:ext uri="{909E8E84-426E-40dd-AFC4-6F175D3DCCD1}">
+            <a:ext uri="{909E8E84-426E-40DD-AFC4-6F175D3DCCD1}">
               <a14:hiddenFill xmlns:a14="http://schemas.microsoft.com/office/drawing/2010/main">
                 <a:solidFill>
                   <a:srgbClr val="FFFFFF"/>
@@ -15605,7 +15687,7 @@
   <p:timing>
     <p:tnLst>
       <p:par>
-        <p:cTn xmlns:p14="http://schemas.microsoft.com/office/powerpoint/2010/main" id="1" dur="indefinite" restart="never" nodeType="tmRoot"/>
+        <p:cTn id="1" dur="indefinite" restart="never" nodeType="tmRoot"/>
       </p:par>
     </p:tnLst>
   </p:timing>
@@ -15748,7 +15830,48 @@
           </a:prstGeom>
           <a:noFill/>
           <a:extLst>
-            <a:ext uri="{909E8E84-426E-40dd-AFC4-6F175D3DCCD1}">
+            <a:ext uri="{909E8E84-426E-40DD-AFC4-6F175D3DCCD1}">
+              <a14:hiddenFill xmlns:a14="http://schemas.microsoft.com/office/drawing/2010/main">
+                <a:solidFill>
+                  <a:srgbClr val="FFFFFF"/>
+                </a:solidFill>
+              </a14:hiddenFill>
+            </a:ext>
+          </a:extLst>
+        </p:spPr>
+      </p:pic>
+      <p:pic>
+        <p:nvPicPr>
+          <p:cNvPr id="10242" name="Picture 2" descr="http://cdn.moreonfew.com/wp-content/uploads/2014/02/Array_push_javascript.jpg"/>
+          <p:cNvPicPr>
+            <a:picLocks noChangeAspect="1" noChangeArrowheads="1"/>
+          </p:cNvPicPr>
+          <p:nvPr/>
+        </p:nvPicPr>
+        <p:blipFill>
+          <a:blip r:embed="rId3">
+            <a:extLst>
+              <a:ext uri="{28A0092B-C50C-407E-A947-70E740481C1C}">
+                <a14:useLocalDpi xmlns:a14="http://schemas.microsoft.com/office/drawing/2010/main" val="0"/>
+              </a:ext>
+            </a:extLst>
+          </a:blip>
+          <a:srcRect/>
+          <a:stretch>
+            <a:fillRect/>
+          </a:stretch>
+        </p:blipFill>
+        <p:spPr bwMode="auto">
+          <a:xfrm>
+            <a:off x="4100342" y="3644211"/>
+            <a:ext cx="4476750" cy="1462088"/>
+          </a:xfrm>
+          <a:prstGeom prst="rect">
+            <a:avLst/>
+          </a:prstGeom>
+          <a:noFill/>
+          <a:extLst>
+            <a:ext uri="{909E8E84-426E-40DD-AFC4-6F175D3DCCD1}">
               <a14:hiddenFill xmlns:a14="http://schemas.microsoft.com/office/drawing/2010/main">
                 <a:solidFill>
                   <a:srgbClr val="FFFFFF"/>
@@ -15771,7 +15894,7 @@
   <p:timing>
     <p:tnLst>
       <p:par>
-        <p:cTn xmlns:p14="http://schemas.microsoft.com/office/powerpoint/2010/main" id="1" dur="indefinite" restart="never" nodeType="tmRoot"/>
+        <p:cTn id="1" dur="indefinite" restart="never" nodeType="tmRoot"/>
       </p:par>
     </p:tnLst>
   </p:timing>
@@ -15926,7 +16049,7 @@
   <p:timing>
     <p:tnLst>
       <p:par>
-        <p:cTn xmlns:p14="http://schemas.microsoft.com/office/powerpoint/2010/main" id="1" dur="indefinite" restart="never" nodeType="tmRoot">
+        <p:cTn id="1" dur="indefinite" restart="never" nodeType="tmRoot">
           <p:childTnLst>
             <p:seq concurrent="1" nextAc="seek">
               <p:cTn id="2" dur="indefinite" nodeType="mainSeq">
@@ -16659,11 +16782,11 @@
   <p:clrMapOvr>
     <a:masterClrMapping/>
   </p:clrMapOvr>
-  <p:transition xmlns:p14="http://schemas.microsoft.com/office/powerpoint/2010/main" spd="med"/>
+  <p:transition spd="med"/>
   <p:timing>
     <p:tnLst>
       <p:par>
-        <p:cTn xmlns:p14="http://schemas.microsoft.com/office/powerpoint/2010/main" id="1" dur="indefinite" restart="never" nodeType="tmRoot">
+        <p:cTn id="1" dur="indefinite" restart="never" nodeType="tmRoot">
           <p:childTnLst>
             <p:seq concurrent="1" nextAc="seek">
               <p:cTn id="2" dur="indefinite" nodeType="mainSeq">
@@ -17628,11 +17751,11 @@
   <p:clrMapOvr>
     <a:masterClrMapping/>
   </p:clrMapOvr>
-  <p:transition xmlns:p14="http://schemas.microsoft.com/office/powerpoint/2010/main" spd="med"/>
+  <p:transition spd="med"/>
   <p:timing>
     <p:tnLst>
       <p:par>
-        <p:cTn xmlns:p14="http://schemas.microsoft.com/office/powerpoint/2010/main" id="1" dur="indefinite" restart="never" nodeType="tmRoot">
+        <p:cTn id="1" dur="indefinite" restart="never" nodeType="tmRoot">
           <p:childTnLst>
             <p:seq concurrent="1" nextAc="seek">
               <p:cTn id="2" dur="indefinite" nodeType="mainSeq">
@@ -18436,7 +18559,7 @@
           </a:prstGeom>
           <a:noFill/>
           <a:extLst>
-            <a:ext uri="{909E8E84-426E-40dd-AFC4-6F175D3DCCD1}">
+            <a:ext uri="{909E8E84-426E-40DD-AFC4-6F175D3DCCD1}">
               <a14:hiddenFill xmlns:a14="http://schemas.microsoft.com/office/drawing/2010/main">
                 <a:solidFill>
                   <a:srgbClr val="FFFFFF"/>
@@ -18668,6 +18791,47 @@
           </a:p>
         </p:txBody>
       </p:sp>
+      <p:pic>
+        <p:nvPicPr>
+          <p:cNvPr id="8" name="Picture 5" descr="C:\Users\i309691\Downloads\equipmentprotection3.png"/>
+          <p:cNvPicPr>
+            <a:picLocks noChangeAspect="1" noChangeArrowheads="1"/>
+          </p:cNvPicPr>
+          <p:nvPr/>
+        </p:nvPicPr>
+        <p:blipFill>
+          <a:blip r:embed="rId5" cstate="print">
+            <a:extLst>
+              <a:ext uri="{28A0092B-C50C-407E-A947-70E740481C1C}">
+                <a14:useLocalDpi xmlns:a14="http://schemas.microsoft.com/office/drawing/2010/main" val="0"/>
+              </a:ext>
+            </a:extLst>
+          </a:blip>
+          <a:srcRect/>
+          <a:stretch>
+            <a:fillRect/>
+          </a:stretch>
+        </p:blipFill>
+        <p:spPr bwMode="auto">
+          <a:xfrm>
+            <a:off x="523326" y="334752"/>
+            <a:ext cx="1639874" cy="1639874"/>
+          </a:xfrm>
+          <a:prstGeom prst="rect">
+            <a:avLst/>
+          </a:prstGeom>
+          <a:noFill/>
+          <a:extLst>
+            <a:ext uri="{909E8E84-426E-40DD-AFC4-6F175D3DCCD1}">
+              <a14:hiddenFill xmlns:a14="http://schemas.microsoft.com/office/drawing/2010/main">
+                <a:solidFill>
+                  <a:srgbClr val="FFFFFF"/>
+                </a:solidFill>
+              </a14:hiddenFill>
+            </a:ext>
+          </a:extLst>
+        </p:spPr>
+      </p:pic>
     </p:spTree>
     <p:extLst>
       <p:ext uri="{BB962C8B-B14F-4D97-AF65-F5344CB8AC3E}">
@@ -18681,7 +18845,7 @@
   <p:timing>
     <p:tnLst>
       <p:par>
-        <p:cTn xmlns:p14="http://schemas.microsoft.com/office/powerpoint/2010/main" id="1" dur="indefinite" restart="never" nodeType="tmRoot"/>
+        <p:cTn id="1" dur="indefinite" restart="never" nodeType="tmRoot"/>
       </p:par>
     </p:tnLst>
   </p:timing>
@@ -18891,7 +19055,7 @@
           </a:prstGeom>
           <a:noFill/>
           <a:extLst>
-            <a:ext uri="{909E8E84-426E-40dd-AFC4-6F175D3DCCD1}">
+            <a:ext uri="{909E8E84-426E-40DD-AFC4-6F175D3DCCD1}">
               <a14:hiddenFill xmlns:a14="http://schemas.microsoft.com/office/drawing/2010/main">
                 <a:solidFill>
                   <a:srgbClr val="FFFFFF"/>
@@ -18914,7 +19078,7 @@
   <p:timing>
     <p:tnLst>
       <p:par>
-        <p:cTn xmlns:p14="http://schemas.microsoft.com/office/powerpoint/2010/main" id="1" dur="indefinite" restart="never" nodeType="tmRoot"/>
+        <p:cTn id="1" dur="indefinite" restart="never" nodeType="tmRoot"/>
       </p:par>
     </p:tnLst>
   </p:timing>
@@ -19136,11 +19300,11 @@
   <p:clrMapOvr>
     <a:masterClrMapping/>
   </p:clrMapOvr>
-  <p:transition xmlns:p14="http://schemas.microsoft.com/office/powerpoint/2010/main" spd="med"/>
+  <p:transition spd="med"/>
   <p:timing>
     <p:tnLst>
       <p:par>
-        <p:cTn xmlns:p14="http://schemas.microsoft.com/office/powerpoint/2010/main" id="1" dur="indefinite" restart="never" nodeType="tmRoot">
+        <p:cTn id="1" dur="indefinite" restart="never" nodeType="tmRoot">
           <p:childTnLst>
             <p:seq concurrent="1" nextAc="seek">
               <p:cTn id="2" dur="indefinite" nodeType="mainSeq">
@@ -19771,11 +19935,11 @@
   <p:clrMapOvr>
     <a:masterClrMapping/>
   </p:clrMapOvr>
-  <p:transition xmlns:p14="http://schemas.microsoft.com/office/powerpoint/2010/main" spd="med"/>
+  <p:transition spd="med"/>
   <p:timing>
     <p:tnLst>
       <p:par>
-        <p:cTn xmlns:p14="http://schemas.microsoft.com/office/powerpoint/2010/main" id="1" dur="indefinite" restart="never" nodeType="tmRoot">
+        <p:cTn id="1" dur="indefinite" restart="never" nodeType="tmRoot">
           <p:childTnLst>
             <p:seq concurrent="1" nextAc="seek">
               <p:cTn id="2" dur="indefinite" nodeType="mainSeq">
@@ -20437,11 +20601,11 @@
   <p:clrMapOvr>
     <a:masterClrMapping/>
   </p:clrMapOvr>
-  <p:transition xmlns:p14="http://schemas.microsoft.com/office/powerpoint/2010/main" spd="med"/>
+  <p:transition spd="med"/>
   <p:timing>
     <p:tnLst>
       <p:par>
-        <p:cTn xmlns:p14="http://schemas.microsoft.com/office/powerpoint/2010/main" id="1" dur="indefinite" restart="never" nodeType="tmRoot">
+        <p:cTn id="1" dur="indefinite" restart="never" nodeType="tmRoot">
           <p:childTnLst>
             <p:seq concurrent="1" nextAc="seek">
               <p:cTn id="2" dur="indefinite" nodeType="mainSeq">
@@ -21271,11 +21435,11 @@
   <p:clrMapOvr>
     <a:masterClrMapping/>
   </p:clrMapOvr>
-  <p:transition xmlns:p14="http://schemas.microsoft.com/office/powerpoint/2010/main" spd="med"/>
+  <p:transition spd="med"/>
   <p:timing>
     <p:tnLst>
       <p:par>
-        <p:cTn xmlns:p14="http://schemas.microsoft.com/office/powerpoint/2010/main" id="1" dur="indefinite" restart="never" nodeType="tmRoot">
+        <p:cTn id="1" dur="indefinite" restart="never" nodeType="tmRoot">
           <p:childTnLst>
             <p:seq concurrent="1" nextAc="seek">
               <p:cTn id="2" dur="indefinite" nodeType="mainSeq">
@@ -21709,7 +21873,7 @@
           </a:prstGeom>
           <a:noFill/>
           <a:extLst>
-            <a:ext uri="{909E8E84-426E-40dd-AFC4-6F175D3DCCD1}">
+            <a:ext uri="{909E8E84-426E-40DD-AFC4-6F175D3DCCD1}">
               <a14:hiddenFill xmlns:a14="http://schemas.microsoft.com/office/drawing/2010/main">
                 <a:solidFill>
                   <a:srgbClr val="FFFFFF"/>
@@ -21941,6 +22105,47 @@
           </a:p>
         </p:txBody>
       </p:sp>
+      <p:pic>
+        <p:nvPicPr>
+          <p:cNvPr id="8" name="Picture 5" descr="C:\Users\i309691\Downloads\equipmentprotection3.png"/>
+          <p:cNvPicPr>
+            <a:picLocks noChangeAspect="1" noChangeArrowheads="1"/>
+          </p:cNvPicPr>
+          <p:nvPr/>
+        </p:nvPicPr>
+        <p:blipFill>
+          <a:blip r:embed="rId5" cstate="print">
+            <a:extLst>
+              <a:ext uri="{28A0092B-C50C-407E-A947-70E740481C1C}">
+                <a14:useLocalDpi xmlns:a14="http://schemas.microsoft.com/office/drawing/2010/main" val="0"/>
+              </a:ext>
+            </a:extLst>
+          </a:blip>
+          <a:srcRect/>
+          <a:stretch>
+            <a:fillRect/>
+          </a:stretch>
+        </p:blipFill>
+        <p:spPr bwMode="auto">
+          <a:xfrm>
+            <a:off x="523326" y="334752"/>
+            <a:ext cx="1639874" cy="1639874"/>
+          </a:xfrm>
+          <a:prstGeom prst="rect">
+            <a:avLst/>
+          </a:prstGeom>
+          <a:noFill/>
+          <a:extLst>
+            <a:ext uri="{909E8E84-426E-40DD-AFC4-6F175D3DCCD1}">
+              <a14:hiddenFill xmlns:a14="http://schemas.microsoft.com/office/drawing/2010/main">
+                <a:solidFill>
+                  <a:srgbClr val="FFFFFF"/>
+                </a:solidFill>
+              </a14:hiddenFill>
+            </a:ext>
+          </a:extLst>
+        </p:spPr>
+      </p:pic>
     </p:spTree>
     <p:extLst>
       <p:ext uri="{BB962C8B-B14F-4D97-AF65-F5344CB8AC3E}">
@@ -21954,7 +22159,7 @@
   <p:timing>
     <p:tnLst>
       <p:par>
-        <p:cTn xmlns:p14="http://schemas.microsoft.com/office/powerpoint/2010/main" id="1" dur="indefinite" restart="never" nodeType="tmRoot"/>
+        <p:cTn id="1" dur="indefinite" restart="never" nodeType="tmRoot"/>
       </p:par>
     </p:tnLst>
   </p:timing>
@@ -22044,13 +22249,8 @@
             </a:pPr>
             <a:r>
               <a:rPr lang="bg-BG" dirty="0" smtClean="0"/>
-              <a:t>Функции с </a:t>
-            </a:r>
-            <a:r>
-              <a:rPr lang="bg-BG" dirty="0" smtClean="0"/>
-              <a:t>аргументи</a:t>
-            </a:r>
-            <a:endParaRPr lang="bg-BG" dirty="0" smtClean="0"/>
+              <a:t>Функции с аргументи</a:t>
+            </a:r>
           </a:p>
           <a:p>
             <a:pPr marL="285750" lvl="1" indent="-285750">
@@ -22127,7 +22327,48 @@
           </a:prstGeom>
           <a:noFill/>
           <a:extLst>
-            <a:ext uri="{909E8E84-426E-40dd-AFC4-6F175D3DCCD1}">
+            <a:ext uri="{909E8E84-426E-40DD-AFC4-6F175D3DCCD1}">
+              <a14:hiddenFill xmlns:a14="http://schemas.microsoft.com/office/drawing/2010/main">
+                <a:solidFill>
+                  <a:srgbClr val="FFFFFF"/>
+                </a:solidFill>
+              </a14:hiddenFill>
+            </a:ext>
+          </a:extLst>
+        </p:spPr>
+      </p:pic>
+      <p:pic>
+        <p:nvPicPr>
+          <p:cNvPr id="11266" name="Picture 2" descr="http://theremedyforit.com/wp-content/uploads/2011/12/Function.jpg"/>
+          <p:cNvPicPr>
+            <a:picLocks noChangeAspect="1" noChangeArrowheads="1"/>
+          </p:cNvPicPr>
+          <p:nvPr/>
+        </p:nvPicPr>
+        <p:blipFill>
+          <a:blip r:embed="rId3">
+            <a:extLst>
+              <a:ext uri="{28A0092B-C50C-407E-A947-70E740481C1C}">
+                <a14:useLocalDpi xmlns:a14="http://schemas.microsoft.com/office/drawing/2010/main" val="0"/>
+              </a:ext>
+            </a:extLst>
+          </a:blip>
+          <a:srcRect/>
+          <a:stretch>
+            <a:fillRect/>
+          </a:stretch>
+        </p:blipFill>
+        <p:spPr bwMode="auto">
+          <a:xfrm>
+            <a:off x="4976957" y="3572085"/>
+            <a:ext cx="3403784" cy="1489156"/>
+          </a:xfrm>
+          <a:prstGeom prst="rect">
+            <a:avLst/>
+          </a:prstGeom>
+          <a:noFill/>
+          <a:extLst>
+            <a:ext uri="{909E8E84-426E-40DD-AFC4-6F175D3DCCD1}">
               <a14:hiddenFill xmlns:a14="http://schemas.microsoft.com/office/drawing/2010/main">
                 <a:solidFill>
                   <a:srgbClr val="FFFFFF"/>
@@ -22150,7 +22391,7 @@
   <p:timing>
     <p:tnLst>
       <p:par>
-        <p:cTn xmlns:p14="http://schemas.microsoft.com/office/powerpoint/2010/main" id="1" dur="indefinite" restart="never" nodeType="tmRoot"/>
+        <p:cTn id="1" dur="indefinite" restart="never" nodeType="tmRoot"/>
       </p:par>
     </p:tnLst>
   </p:timing>
@@ -22219,7 +22460,7 @@
             <a:lightRig rig="threePt" dir="t"/>
           </a:scene3d>
           <a:extLst>
-            <a:ext uri="{909E8E84-426E-40dd-AFC4-6F175D3DCCD1}">
+            <a:ext uri="{909E8E84-426E-40DD-AFC4-6F175D3DCCD1}">
               <a14:hiddenFill xmlns:a14="http://schemas.microsoft.com/office/drawing/2010/main">
                 <a:solidFill>
                   <a:srgbClr val="FFFFFF"/>
@@ -22283,7 +22524,7 @@
           </a:prstGeom>
           <a:noFill/>
           <a:extLst>
-            <a:ext uri="{909E8E84-426E-40dd-AFC4-6F175D3DCCD1}">
+            <a:ext uri="{909E8E84-426E-40DD-AFC4-6F175D3DCCD1}">
               <a14:hiddenFill xmlns:a14="http://schemas.microsoft.com/office/drawing/2010/main">
                 <a:solidFill>
                   <a:srgbClr val="FFFFFF"/>
@@ -22327,7 +22568,7 @@
             <a:reflection stA="13000" endPos="22000" dir="5400000" sy="-100000" algn="bl" rotWithShape="0"/>
           </a:effectLst>
           <a:extLst>
-            <a:ext uri="{909E8E84-426E-40dd-AFC4-6F175D3DCCD1}">
+            <a:ext uri="{909E8E84-426E-40DD-AFC4-6F175D3DCCD1}">
               <a14:hiddenFill xmlns:a14="http://schemas.microsoft.com/office/drawing/2010/main">
                 <a:solidFill>
                   <a:srgbClr val="FFFFFF"/>
@@ -22345,7 +22586,7 @@
   <p:timing>
     <p:tnLst>
       <p:par>
-        <p:cTn xmlns:p14="http://schemas.microsoft.com/office/powerpoint/2010/main" id="1" dur="indefinite" restart="never" nodeType="tmRoot"/>
+        <p:cTn id="1" dur="indefinite" restart="never" nodeType="tmRoot"/>
       </p:par>
     </p:tnLst>
   </p:timing>
@@ -22429,11 +22670,7 @@
             </a:pPr>
             <a:r>
               <a:rPr lang="bg-BG" sz="2400" b="1" dirty="0" smtClean="0"/>
-              <a:t>Какво са </a:t>
-            </a:r>
-            <a:r>
-              <a:rPr lang="bg-BG" sz="2400" b="1" dirty="0" smtClean="0"/>
-              <a:t>функциите?</a:t>
+              <a:t>Какво са функциите?</a:t>
             </a:r>
             <a:endParaRPr lang="bg-BG" sz="2400" b="1" dirty="0"/>
           </a:p>
@@ -22577,11 +22814,11 @@
   <p:clrMapOvr>
     <a:masterClrMapping/>
   </p:clrMapOvr>
-  <p:transition xmlns:p14="http://schemas.microsoft.com/office/powerpoint/2010/main" spd="med"/>
+  <p:transition spd="med"/>
   <p:timing>
     <p:tnLst>
       <p:par>
-        <p:cTn xmlns:p14="http://schemas.microsoft.com/office/powerpoint/2010/main" id="1" dur="indefinite" restart="never" nodeType="tmRoot">
+        <p:cTn id="1" dur="indefinite" restart="never" nodeType="tmRoot">
           <p:childTnLst>
             <p:seq concurrent="1" nextAc="seek">
               <p:cTn id="2" dur="indefinite" nodeType="mainSeq">
@@ -23494,7 +23731,6 @@
               <a:rPr lang="bg-BG" b="1" dirty="0" smtClean="0"/>
               <a:t>параметри</a:t>
             </a:r>
-            <a:endParaRPr lang="bg-BG" b="1" dirty="0" smtClean="0"/>
           </a:p>
           <a:p>
             <a:pPr marL="522900" lvl="2" indent="-342900">
@@ -23609,11 +23845,11 @@
   <p:clrMapOvr>
     <a:masterClrMapping/>
   </p:clrMapOvr>
-  <p:transition xmlns:p14="http://schemas.microsoft.com/office/powerpoint/2010/main" spd="med"/>
+  <p:transition spd="med"/>
   <p:timing>
     <p:tnLst>
       <p:par>
-        <p:cTn xmlns:p14="http://schemas.microsoft.com/office/powerpoint/2010/main" id="1" dur="indefinite" restart="never" nodeType="tmRoot">
+        <p:cTn id="1" dur="indefinite" restart="never" nodeType="tmRoot">
           <p:childTnLst>
             <p:seq concurrent="1" nextAc="seek">
               <p:cTn id="2" dur="indefinite" nodeType="mainSeq">
@@ -24317,7 +24553,6 @@
               <a:rPr lang="en-US" sz="2400" b="1" dirty="0" smtClean="0"/>
               <a:t>JavaScript?</a:t>
             </a:r>
-            <a:endParaRPr lang="en-US" sz="2400" b="1" dirty="0" smtClean="0"/>
           </a:p>
           <a:p>
             <a:pPr marL="522900" lvl="2" indent="-342900">
@@ -24332,7 +24567,6 @@
               <a:rPr lang="bg-BG" dirty="0" smtClean="0"/>
               <a:t>рез конструктор за деклариране на функция</a:t>
             </a:r>
-            <a:endParaRPr lang="bg-BG" dirty="0" smtClean="0"/>
           </a:p>
           <a:p>
             <a:pPr lvl="1"/>
@@ -24621,11 +24855,11 @@
   <p:clrMapOvr>
     <a:masterClrMapping/>
   </p:clrMapOvr>
-  <p:transition xmlns:p14="http://schemas.microsoft.com/office/powerpoint/2010/main" spd="med"/>
+  <p:transition spd="med"/>
   <p:timing>
     <p:tnLst>
       <p:par>
-        <p:cTn xmlns:p14="http://schemas.microsoft.com/office/powerpoint/2010/main" id="1" dur="indefinite" restart="never" nodeType="tmRoot">
+        <p:cTn id="1" dur="indefinite" restart="never" nodeType="tmRoot">
           <p:childTnLst>
             <p:seq concurrent="1" nextAc="seek">
               <p:cTn id="2" dur="indefinite" nodeType="mainSeq">
@@ -25324,7 +25558,6 @@
               <a:rPr lang="en-US" sz="2400" b="1" dirty="0" smtClean="0"/>
               <a:t>JavaScript?</a:t>
             </a:r>
-            <a:endParaRPr lang="en-US" sz="2400" b="1" dirty="0" smtClean="0"/>
           </a:p>
           <a:p>
             <a:pPr marL="522900" lvl="2" indent="-342900">
@@ -25548,11 +25781,11 @@
   <p:clrMapOvr>
     <a:masterClrMapping/>
   </p:clrMapOvr>
-  <p:transition xmlns:p14="http://schemas.microsoft.com/office/powerpoint/2010/main" spd="med"/>
+  <p:transition spd="med"/>
   <p:timing>
     <p:tnLst>
       <p:par>
-        <p:cTn xmlns:p14="http://schemas.microsoft.com/office/powerpoint/2010/main" id="1" dur="indefinite" restart="never" nodeType="tmRoot">
+        <p:cTn id="1" dur="indefinite" restart="never" nodeType="tmRoot">
           <p:childTnLst>
             <p:seq concurrent="1" nextAc="seek">
               <p:cTn id="2" dur="indefinite" nodeType="mainSeq">
@@ -26195,11 +26428,11 @@
   <p:clrMapOvr>
     <a:masterClrMapping/>
   </p:clrMapOvr>
-  <p:transition xmlns:p14="http://schemas.microsoft.com/office/powerpoint/2010/main" spd="med"/>
+  <p:transition spd="med"/>
   <p:timing>
     <p:tnLst>
       <p:par>
-        <p:cTn xmlns:p14="http://schemas.microsoft.com/office/powerpoint/2010/main" id="1" dur="indefinite" restart="never" nodeType="tmRoot">
+        <p:cTn id="1" dur="indefinite" restart="never" nodeType="tmRoot">
           <p:childTnLst>
             <p:seq concurrent="1" nextAc="seek">
               <p:cTn id="2" dur="indefinite" nodeType="mainSeq">
@@ -26666,11 +26899,11 @@
   <p:clrMapOvr>
     <a:masterClrMapping/>
   </p:clrMapOvr>
-  <p:transition xmlns:p14="http://schemas.microsoft.com/office/powerpoint/2010/main" spd="med"/>
+  <p:transition spd="med"/>
   <p:timing>
     <p:tnLst>
       <p:par>
-        <p:cTn xmlns:p14="http://schemas.microsoft.com/office/powerpoint/2010/main" id="1" dur="indefinite" restart="never" nodeType="tmRoot">
+        <p:cTn id="1" dur="indefinite" restart="never" nodeType="tmRoot">
           <p:childTnLst>
             <p:seq concurrent="1" nextAc="seek">
               <p:cTn id="2" dur="indefinite" nodeType="mainSeq">
@@ -27266,11 +27499,11 @@
   <p:clrMapOvr>
     <a:masterClrMapping/>
   </p:clrMapOvr>
-  <p:transition xmlns:p14="http://schemas.microsoft.com/office/powerpoint/2010/main" spd="med"/>
+  <p:transition spd="med"/>
   <p:timing>
     <p:tnLst>
       <p:par>
-        <p:cTn xmlns:p14="http://schemas.microsoft.com/office/powerpoint/2010/main" id="1" dur="indefinite" restart="never" nodeType="tmRoot">
+        <p:cTn id="1" dur="indefinite" restart="never" nodeType="tmRoot">
           <p:childTnLst>
             <p:seq concurrent="1" nextAc="seek">
               <p:cTn id="2" dur="indefinite" nodeType="mainSeq">
@@ -27816,11 +28049,11 @@
   <p:clrMapOvr>
     <a:masterClrMapping/>
   </p:clrMapOvr>
-  <p:transition xmlns:p14="http://schemas.microsoft.com/office/powerpoint/2010/main" spd="med"/>
+  <p:transition spd="med"/>
   <p:timing>
     <p:tnLst>
       <p:par>
-        <p:cTn xmlns:p14="http://schemas.microsoft.com/office/powerpoint/2010/main" id="1" dur="indefinite" restart="never" nodeType="tmRoot">
+        <p:cTn id="1" dur="indefinite" restart="never" nodeType="tmRoot">
           <p:childTnLst>
             <p:seq concurrent="1" nextAc="seek">
               <p:cTn id="2" dur="indefinite" nodeType="mainSeq">
@@ -28433,11 +28666,11 @@
   <p:clrMapOvr>
     <a:masterClrMapping/>
   </p:clrMapOvr>
-  <p:transition xmlns:p14="http://schemas.microsoft.com/office/powerpoint/2010/main" spd="med"/>
+  <p:transition spd="med"/>
   <p:timing>
     <p:tnLst>
       <p:par>
-        <p:cTn xmlns:p14="http://schemas.microsoft.com/office/powerpoint/2010/main" id="1" dur="indefinite" restart="never" nodeType="tmRoot">
+        <p:cTn id="1" dur="indefinite" restart="never" nodeType="tmRoot">
           <p:childTnLst>
             <p:seq concurrent="1" nextAc="seek">
               <p:cTn id="2" dur="indefinite" nodeType="mainSeq">
@@ -28972,7 +29205,7 @@
           </a:prstGeom>
           <a:noFill/>
           <a:extLst>
-            <a:ext uri="{909E8E84-426E-40dd-AFC4-6F175D3DCCD1}">
+            <a:ext uri="{909E8E84-426E-40DD-AFC4-6F175D3DCCD1}">
               <a14:hiddenFill xmlns:a14="http://schemas.microsoft.com/office/drawing/2010/main">
                 <a:solidFill>
                   <a:srgbClr val="FFFFFF"/>
@@ -29204,6 +29437,47 @@
           </a:p>
         </p:txBody>
       </p:sp>
+      <p:pic>
+        <p:nvPicPr>
+          <p:cNvPr id="8" name="Picture 5" descr="C:\Users\i309691\Downloads\equipmentprotection3.png"/>
+          <p:cNvPicPr>
+            <a:picLocks noChangeAspect="1" noChangeArrowheads="1"/>
+          </p:cNvPicPr>
+          <p:nvPr/>
+        </p:nvPicPr>
+        <p:blipFill>
+          <a:blip r:embed="rId5" cstate="print">
+            <a:extLst>
+              <a:ext uri="{28A0092B-C50C-407E-A947-70E740481C1C}">
+                <a14:useLocalDpi xmlns:a14="http://schemas.microsoft.com/office/drawing/2010/main" val="0"/>
+              </a:ext>
+            </a:extLst>
+          </a:blip>
+          <a:srcRect/>
+          <a:stretch>
+            <a:fillRect/>
+          </a:stretch>
+        </p:blipFill>
+        <p:spPr bwMode="auto">
+          <a:xfrm>
+            <a:off x="523326" y="334752"/>
+            <a:ext cx="1639874" cy="1639874"/>
+          </a:xfrm>
+          <a:prstGeom prst="rect">
+            <a:avLst/>
+          </a:prstGeom>
+          <a:noFill/>
+          <a:extLst>
+            <a:ext uri="{909E8E84-426E-40DD-AFC4-6F175D3DCCD1}">
+              <a14:hiddenFill xmlns:a14="http://schemas.microsoft.com/office/drawing/2010/main">
+                <a:solidFill>
+                  <a:srgbClr val="FFFFFF"/>
+                </a:solidFill>
+              </a14:hiddenFill>
+            </a:ext>
+          </a:extLst>
+        </p:spPr>
+      </p:pic>
     </p:spTree>
     <p:extLst>
       <p:ext uri="{BB962C8B-B14F-4D97-AF65-F5344CB8AC3E}">
@@ -29217,7 +29491,7 @@
   <p:timing>
     <p:tnLst>
       <p:par>
-        <p:cTn xmlns:p14="http://schemas.microsoft.com/office/powerpoint/2010/main" id="1" dur="indefinite" restart="never" nodeType="tmRoot"/>
+        <p:cTn id="1" dur="indefinite" restart="never" nodeType="tmRoot"/>
       </p:par>
     </p:tnLst>
   </p:timing>
@@ -29332,16 +29606,13 @@
               <a:rPr lang="en-US" dirty="0" smtClean="0"/>
               <a:t>“ C-like “ </a:t>
             </a:r>
+            <a:endParaRPr lang="bg-BG" dirty="0" smtClean="0"/>
           </a:p>
           <a:p>
             <a:pPr marL="285750" lvl="1" indent="-285750">
               <a:buFont typeface="Wingdings" panose="05000000000000000000" pitchFamily="2" charset="2"/>
               <a:buChar char="ü"/>
             </a:pPr>
-            <a:r>
-              <a:rPr lang="en-US" dirty="0" err="1" smtClean="0"/>
-              <a:t>ECMAscript</a:t>
-            </a:r>
             <a:endParaRPr lang="bg-BG" dirty="0" smtClean="0"/>
           </a:p>
           <a:p>
@@ -29349,7 +29620,34 @@
               <a:buFont typeface="Wingdings" panose="05000000000000000000" pitchFamily="2" charset="2"/>
               <a:buChar char="ü"/>
             </a:pPr>
-            <a:endParaRPr lang="en-US" dirty="0" smtClean="0"/>
+            <a:endParaRPr lang="bg-BG" dirty="0"/>
+          </a:p>
+          <a:p>
+            <a:pPr lvl="1"/>
+            <a:endParaRPr lang="bg-BG" b="1" dirty="0">
+              <a:solidFill>
+                <a:srgbClr val="FF0000"/>
+              </a:solidFill>
+            </a:endParaRPr>
+          </a:p>
+          <a:p>
+            <a:pPr marL="285750" lvl="1" indent="-285750">
+              <a:buFont typeface="Wingdings" panose="05000000000000000000" pitchFamily="2" charset="2"/>
+              <a:buChar char="ü"/>
+            </a:pPr>
+            <a:r>
+              <a:rPr lang="bg-BG" sz="2200" b="1" dirty="0" err="1" smtClean="0">
+                <a:solidFill>
+                  <a:srgbClr val="FF0000"/>
+                </a:solidFill>
+              </a:rPr>
+              <a:t>Мултиплатформен</a:t>
+            </a:r>
+            <a:endParaRPr lang="bg-BG" sz="2200" b="1" dirty="0" smtClean="0">
+              <a:solidFill>
+                <a:srgbClr val="FF0000"/>
+              </a:solidFill>
+            </a:endParaRPr>
           </a:p>
         </p:txBody>
       </p:sp>
@@ -29384,7 +29682,130 @@
           </a:prstGeom>
           <a:noFill/>
           <a:extLst>
-            <a:ext uri="{909E8E84-426E-40dd-AFC4-6F175D3DCCD1}">
+            <a:ext uri="{909E8E84-426E-40DD-AFC4-6F175D3DCCD1}">
+              <a14:hiddenFill xmlns:a14="http://schemas.microsoft.com/office/drawing/2010/main">
+                <a:solidFill>
+                  <a:srgbClr val="FFFFFF"/>
+                </a:solidFill>
+              </a14:hiddenFill>
+            </a:ext>
+          </a:extLst>
+        </p:spPr>
+      </p:pic>
+      <p:pic>
+        <p:nvPicPr>
+          <p:cNvPr id="1026" name="Picture 2" descr="http://cnet4.cbsistatic.com/hub/i/2011/10/27/a66dfbb7-fdc7-11e2-8c7c-d4ae52e62bcc/android-wallpaper5_2560x1600_1.jpg"/>
+          <p:cNvPicPr>
+            <a:picLocks noChangeAspect="1" noChangeArrowheads="1"/>
+          </p:cNvPicPr>
+          <p:nvPr/>
+        </p:nvPicPr>
+        <p:blipFill>
+          <a:blip r:embed="rId4" cstate="print">
+            <a:extLst>
+              <a:ext uri="{28A0092B-C50C-407E-A947-70E740481C1C}">
+                <a14:useLocalDpi xmlns:a14="http://schemas.microsoft.com/office/drawing/2010/main" val="0"/>
+              </a:ext>
+            </a:extLst>
+          </a:blip>
+          <a:srcRect/>
+          <a:stretch>
+            <a:fillRect/>
+          </a:stretch>
+        </p:blipFill>
+        <p:spPr bwMode="auto">
+          <a:xfrm>
+            <a:off x="347076" y="5218339"/>
+            <a:ext cx="843451" cy="842397"/>
+          </a:xfrm>
+          <a:prstGeom prst="rect">
+            <a:avLst/>
+          </a:prstGeom>
+          <a:noFill/>
+          <a:extLst>
+            <a:ext uri="{909E8E84-426E-40DD-AFC4-6F175D3DCCD1}">
+              <a14:hiddenFill xmlns:a14="http://schemas.microsoft.com/office/drawing/2010/main">
+                <a:solidFill>
+                  <a:srgbClr val="FFFFFF"/>
+                </a:solidFill>
+              </a14:hiddenFill>
+            </a:ext>
+          </a:extLst>
+        </p:spPr>
+      </p:pic>
+      <p:pic>
+        <p:nvPicPr>
+          <p:cNvPr id="1027" name="Picture 3" descr="C:\Users\i309691\Downloads\apple.png"/>
+          <p:cNvPicPr>
+            <a:picLocks noChangeAspect="1" noChangeArrowheads="1"/>
+          </p:cNvPicPr>
+          <p:nvPr/>
+        </p:nvPicPr>
+        <p:blipFill>
+          <a:blip r:embed="rId5" cstate="print">
+            <a:extLst>
+              <a:ext uri="{28A0092B-C50C-407E-A947-70E740481C1C}">
+                <a14:useLocalDpi xmlns:a14="http://schemas.microsoft.com/office/drawing/2010/main" val="0"/>
+              </a:ext>
+            </a:extLst>
+          </a:blip>
+          <a:srcRect/>
+          <a:stretch>
+            <a:fillRect/>
+          </a:stretch>
+        </p:blipFill>
+        <p:spPr bwMode="auto">
+          <a:xfrm>
+            <a:off x="1318912" y="5218339"/>
+            <a:ext cx="842397" cy="842397"/>
+          </a:xfrm>
+          <a:prstGeom prst="rect">
+            <a:avLst/>
+          </a:prstGeom>
+          <a:noFill/>
+          <a:extLst>
+            <a:ext uri="{909E8E84-426E-40DD-AFC4-6F175D3DCCD1}">
+              <a14:hiddenFill xmlns:a14="http://schemas.microsoft.com/office/drawing/2010/main">
+                <a:solidFill>
+                  <a:srgbClr val="FFFFFF"/>
+                </a:solidFill>
+              </a14:hiddenFill>
+            </a:ext>
+          </a:extLst>
+        </p:spPr>
+      </p:pic>
+      <p:pic>
+        <p:nvPicPr>
+          <p:cNvPr id="1029" name="Picture 5" descr="https://pbs.twimg.com/profile_images/2765347661/0fb70b43f3d59a09d02a7225dff9dc54_400x400.png"/>
+          <p:cNvPicPr>
+            <a:picLocks noChangeAspect="1" noChangeArrowheads="1"/>
+          </p:cNvPicPr>
+          <p:nvPr/>
+        </p:nvPicPr>
+        <p:blipFill>
+          <a:blip r:embed="rId6" cstate="print">
+            <a:extLst>
+              <a:ext uri="{28A0092B-C50C-407E-A947-70E740481C1C}">
+                <a14:useLocalDpi xmlns:a14="http://schemas.microsoft.com/office/drawing/2010/main" val="0"/>
+              </a:ext>
+            </a:extLst>
+          </a:blip>
+          <a:srcRect/>
+          <a:stretch>
+            <a:fillRect/>
+          </a:stretch>
+        </p:blipFill>
+        <p:spPr bwMode="auto">
+          <a:xfrm>
+            <a:off x="2339555" y="5282361"/>
+            <a:ext cx="778375" cy="778375"/>
+          </a:xfrm>
+          <a:prstGeom prst="rect">
+            <a:avLst/>
+          </a:prstGeom>
+          <a:noFill/>
+          <a:extLst>
+            <a:ext uri="{909E8E84-426E-40DD-AFC4-6F175D3DCCD1}">
               <a14:hiddenFill xmlns:a14="http://schemas.microsoft.com/office/drawing/2010/main">
                 <a:solidFill>
                   <a:srgbClr val="FFFFFF"/>
@@ -29399,11 +29820,11 @@
   <p:clrMapOvr>
     <a:masterClrMapping/>
   </p:clrMapOvr>
-  <p:transition xmlns:p14="http://schemas.microsoft.com/office/powerpoint/2010/main" spd="med"/>
+  <p:transition spd="med"/>
   <p:timing>
     <p:tnLst>
       <p:par>
-        <p:cTn xmlns:p14="http://schemas.microsoft.com/office/powerpoint/2010/main" id="1" dur="indefinite" restart="never" nodeType="tmRoot">
+        <p:cTn id="1" dur="indefinite" restart="never" nodeType="tmRoot">
           <p:childTnLst>
             <p:seq concurrent="1" nextAc="seek">
               <p:cTn id="2" dur="indefinite" nodeType="mainSeq">
@@ -29741,7 +30162,7 @@
                                         <p:tgtEl>
                                           <p:spTgt spid="3">
                                             <p:txEl>
-                                              <p:pRg st="5" end="5"/>
+                                              <p:pRg st="8" end="8"/>
                                             </p:txEl>
                                           </p:spTgt>
                                         </p:tgtEl>
@@ -29759,9 +30180,158 @@
                                         <p:tgtEl>
                                           <p:spTgt spid="3">
                                             <p:txEl>
-                                              <p:pRg st="5" end="5"/>
-                                            </p:txEl>
-                                          </p:spTgt>
+                                              <p:pRg st="8" end="8"/>
+                                            </p:txEl>
+                                          </p:spTgt>
+                                        </p:tgtEl>
+                                      </p:cBhvr>
+                                    </p:animEffect>
+                                  </p:childTnLst>
+                                </p:cTn>
+                              </p:par>
+                            </p:childTnLst>
+                          </p:cTn>
+                        </p:par>
+                        <p:par>
+                          <p:cTn id="33" fill="hold">
+                            <p:stCondLst>
+                              <p:cond delay="500"/>
+                            </p:stCondLst>
+                            <p:childTnLst>
+                              <p:par>
+                                <p:cTn id="34" presetID="10" presetClass="entr" presetSubtype="0" fill="hold" nodeType="afterEffect">
+                                  <p:stCondLst>
+                                    <p:cond delay="0"/>
+                                  </p:stCondLst>
+                                  <p:childTnLst>
+                                    <p:set>
+                                      <p:cBhvr>
+                                        <p:cTn id="35" dur="1" fill="hold">
+                                          <p:stCondLst>
+                                            <p:cond delay="0"/>
+                                          </p:stCondLst>
+                                        </p:cTn>
+                                        <p:tgtEl>
+                                          <p:spTgt spid="1029"/>
+                                        </p:tgtEl>
+                                        <p:attrNameLst>
+                                          <p:attrName>style.visibility</p:attrName>
+                                        </p:attrNameLst>
+                                      </p:cBhvr>
+                                      <p:to>
+                                        <p:strVal val="visible"/>
+                                      </p:to>
+                                    </p:set>
+                                    <p:animEffect transition="in" filter="fade">
+                                      <p:cBhvr>
+                                        <p:cTn id="36" dur="500"/>
+                                        <p:tgtEl>
+                                          <p:spTgt spid="1029"/>
+                                        </p:tgtEl>
+                                      </p:cBhvr>
+                                    </p:animEffect>
+                                  </p:childTnLst>
+                                </p:cTn>
+                              </p:par>
+                              <p:par>
+                                <p:cTn id="37" presetID="10" presetClass="entr" presetSubtype="0" fill="hold" nodeType="withEffect">
+                                  <p:stCondLst>
+                                    <p:cond delay="0"/>
+                                  </p:stCondLst>
+                                  <p:childTnLst>
+                                    <p:set>
+                                      <p:cBhvr>
+                                        <p:cTn id="38" dur="1" fill="hold">
+                                          <p:stCondLst>
+                                            <p:cond delay="0"/>
+                                          </p:stCondLst>
+                                        </p:cTn>
+                                        <p:tgtEl>
+                                          <p:spTgt spid="1027"/>
+                                        </p:tgtEl>
+                                        <p:attrNameLst>
+                                          <p:attrName>style.visibility</p:attrName>
+                                        </p:attrNameLst>
+                                      </p:cBhvr>
+                                      <p:to>
+                                        <p:strVal val="visible"/>
+                                      </p:to>
+                                    </p:set>
+                                    <p:animEffect transition="in" filter="fade">
+                                      <p:cBhvr>
+                                        <p:cTn id="39" dur="500"/>
+                                        <p:tgtEl>
+                                          <p:spTgt spid="1027"/>
+                                        </p:tgtEl>
+                                      </p:cBhvr>
+                                    </p:animEffect>
+                                  </p:childTnLst>
+                                </p:cTn>
+                              </p:par>
+                              <p:par>
+                                <p:cTn id="40" presetID="10" presetClass="entr" presetSubtype="0" fill="hold" nodeType="withEffect">
+                                  <p:stCondLst>
+                                    <p:cond delay="0"/>
+                                  </p:stCondLst>
+                                  <p:childTnLst>
+                                    <p:set>
+                                      <p:cBhvr>
+                                        <p:cTn id="41" dur="1" fill="hold">
+                                          <p:stCondLst>
+                                            <p:cond delay="0"/>
+                                          </p:stCondLst>
+                                        </p:cTn>
+                                        <p:tgtEl>
+                                          <p:spTgt spid="1026"/>
+                                        </p:tgtEl>
+                                        <p:attrNameLst>
+                                          <p:attrName>style.visibility</p:attrName>
+                                        </p:attrNameLst>
+                                      </p:cBhvr>
+                                      <p:to>
+                                        <p:strVal val="visible"/>
+                                      </p:to>
+                                    </p:set>
+                                    <p:animEffect transition="in" filter="fade">
+                                      <p:cBhvr>
+                                        <p:cTn id="42" dur="500"/>
+                                        <p:tgtEl>
+                                          <p:spTgt spid="1026"/>
+                                        </p:tgtEl>
+                                      </p:cBhvr>
+                                    </p:animEffect>
+                                  </p:childTnLst>
+                                </p:cTn>
+                              </p:par>
+                              <p:par>
+                                <p:cTn id="43" presetID="10" presetClass="entr" presetSubtype="0" fill="hold" nodeType="withEffect">
+                                  <p:stCondLst>
+                                    <p:cond delay="0"/>
+                                  </p:stCondLst>
+                                  <p:childTnLst>
+                                    <p:set>
+                                      <p:cBhvr>
+                                        <p:cTn id="44" dur="1" fill="hold">
+                                          <p:stCondLst>
+                                            <p:cond delay="0"/>
+                                          </p:stCondLst>
+                                        </p:cTn>
+                                        <p:tgtEl>
+                                          <p:spTgt spid="2050"/>
+                                        </p:tgtEl>
+                                        <p:attrNameLst>
+                                          <p:attrName>style.visibility</p:attrName>
+                                        </p:attrNameLst>
+                                      </p:cBhvr>
+                                      <p:to>
+                                        <p:strVal val="visible"/>
+                                      </p:to>
+                                    </p:set>
+                                    <p:animEffect transition="in" filter="fade">
+                                      <p:cBhvr>
+                                        <p:cTn id="45" dur="500"/>
+                                        <p:tgtEl>
+                                          <p:spTgt spid="2050"/>
                                         </p:tgtEl>
                                       </p:cBhvr>
                                     </p:animEffect>
@@ -29924,7 +30494,7 @@
   <p:timing>
     <p:tnLst>
       <p:par>
-        <p:cTn xmlns:p14="http://schemas.microsoft.com/office/powerpoint/2010/main" id="1" dur="indefinite" restart="never" nodeType="tmRoot"/>
+        <p:cTn id="1" dur="indefinite" restart="never" nodeType="tmRoot"/>
       </p:par>
     </p:tnLst>
   </p:timing>
@@ -29953,11 +30523,11 @@
   <p:clrMapOvr>
     <a:masterClrMapping/>
   </p:clrMapOvr>
-  <p:transition xmlns:p14="http://schemas.microsoft.com/office/powerpoint/2010/main" spd="med"/>
+  <p:transition spd="med"/>
   <p:timing>
     <p:tnLst>
       <p:par>
-        <p:cTn xmlns:p14="http://schemas.microsoft.com/office/powerpoint/2010/main" id="1" dur="indefinite" restart="never" nodeType="tmRoot"/>
+        <p:cTn id="1" dur="indefinite" restart="never" nodeType="tmRoot"/>
       </p:par>
     </p:tnLst>
   </p:timing>
@@ -29986,11 +30556,11 @@
   <p:clrMapOvr>
     <a:masterClrMapping/>
   </p:clrMapOvr>
-  <p:transition xmlns:p14="http://schemas.microsoft.com/office/powerpoint/2010/main"/>
+  <p:transition/>
   <p:timing>
     <p:tnLst>
       <p:par>
-        <p:cTn xmlns:p14="http://schemas.microsoft.com/office/powerpoint/2010/main" id="1" dur="indefinite" restart="never" nodeType="tmRoot"/>
+        <p:cTn id="1" dur="indefinite" restart="never" nodeType="tmRoot"/>
       </p:par>
     </p:tnLst>
   </p:timing>
@@ -30147,7 +30717,48 @@
           </a:prstGeom>
           <a:noFill/>
           <a:extLst>
-            <a:ext uri="{909E8E84-426E-40dd-AFC4-6F175D3DCCD1}">
+            <a:ext uri="{909E8E84-426E-40DD-AFC4-6F175D3DCCD1}">
+              <a14:hiddenFill xmlns:a14="http://schemas.microsoft.com/office/drawing/2010/main">
+                <a:solidFill>
+                  <a:srgbClr val="FFFFFF"/>
+                </a:solidFill>
+              </a14:hiddenFill>
+            </a:ext>
+          </a:extLst>
+        </p:spPr>
+      </p:pic>
+      <p:pic>
+        <p:nvPicPr>
+          <p:cNvPr id="3074" name="Picture 2" descr="http://img.c4learn.com/2012/03/Boolean-data-type-in-java-programming.jpg"/>
+          <p:cNvPicPr>
+            <a:picLocks noChangeAspect="1" noChangeArrowheads="1"/>
+          </p:cNvPicPr>
+          <p:nvPr/>
+        </p:nvPicPr>
+        <p:blipFill>
+          <a:blip r:embed="rId3">
+            <a:extLst>
+              <a:ext uri="{28A0092B-C50C-407E-A947-70E740481C1C}">
+                <a14:useLocalDpi xmlns:a14="http://schemas.microsoft.com/office/drawing/2010/main" val="0"/>
+              </a:ext>
+            </a:extLst>
+          </a:blip>
+          <a:srcRect/>
+          <a:stretch>
+            <a:fillRect/>
+          </a:stretch>
+        </p:blipFill>
+        <p:spPr bwMode="auto">
+          <a:xfrm>
+            <a:off x="4213697" y="3449401"/>
+            <a:ext cx="3829050" cy="2876551"/>
+          </a:xfrm>
+          <a:prstGeom prst="rect">
+            <a:avLst/>
+          </a:prstGeom>
+          <a:noFill/>
+          <a:extLst>
+            <a:ext uri="{909E8E84-426E-40DD-AFC4-6F175D3DCCD1}">
               <a14:hiddenFill xmlns:a14="http://schemas.microsoft.com/office/drawing/2010/main">
                 <a:solidFill>
                   <a:srgbClr val="FFFFFF"/>
@@ -30170,7 +30781,7 @@
   <p:timing>
     <p:tnLst>
       <p:par>
-        <p:cTn xmlns:p14="http://schemas.microsoft.com/office/powerpoint/2010/main" id="1" dur="indefinite" restart="never" nodeType="tmRoot"/>
+        <p:cTn id="1" dur="indefinite" restart="never" nodeType="tmRoot"/>
       </p:par>
     </p:tnLst>
   </p:timing>
@@ -30222,7 +30833,7 @@
             </a:br>
             <a:r>
               <a:rPr lang="en-US" sz="2000" b="0" dirty="0" smtClean="0"/>
-              <a:t>Overview</a:t>
+              <a:t>Number</a:t>
             </a:r>
             <a:endParaRPr lang="en-US" sz="2000" b="0" dirty="0"/>
           </a:p>
@@ -30251,7 +30862,11 @@
             <a:pPr lvl="1"/>
             <a:r>
               <a:rPr lang="bg-BG" sz="2400" b="1" dirty="0" smtClean="0"/>
-              <a:t>  Целочислен тип</a:t>
+              <a:t>  Целочислен </a:t>
+            </a:r>
+            <a:r>
+              <a:rPr lang="bg-BG" sz="2400" b="1" dirty="0" smtClean="0"/>
+              <a:t>тип</a:t>
             </a:r>
           </a:p>
           <a:p>
@@ -30287,21 +30902,49 @@
             </a:pPr>
             <a:r>
               <a:rPr lang="bg-BG" sz="2200" dirty="0" smtClean="0"/>
-              <a:t>Всички обекти от тип </a:t>
-            </a:r>
-            <a:r>
-              <a:rPr lang="en-US" sz="2200" dirty="0" smtClean="0"/>
+              <a:t>Всички обекти от тип</a:t>
+            </a:r>
+            <a:r>
+              <a:rPr lang="bg-BG" sz="2200" dirty="0" smtClean="0">
+                <a:solidFill>
+                  <a:srgbClr val="FF0000"/>
+                </a:solidFill>
+              </a:rPr>
+              <a:t> </a:t>
+            </a:r>
+            <a:r>
+              <a:rPr lang="en-US" sz="2200" b="1" dirty="0" smtClean="0">
+                <a:solidFill>
+                  <a:srgbClr val="FF0000"/>
+                </a:solidFill>
+              </a:rPr>
               <a:t>Number </a:t>
             </a:r>
             <a:r>
               <a:rPr lang="bg-BG" sz="2200" dirty="0" smtClean="0"/>
-              <a:t>са </a:t>
-            </a:r>
-            <a:r>
-              <a:rPr lang="en-US" sz="2200" dirty="0" smtClean="0"/>
+              <a:t>са</a:t>
+            </a:r>
+            <a:r>
+              <a:rPr lang="bg-BG" sz="2200" b="1" dirty="0" smtClean="0">
+                <a:solidFill>
+                  <a:srgbClr val="FF0000"/>
+                </a:solidFill>
+              </a:rPr>
+              <a:t> </a:t>
+            </a:r>
+            <a:r>
+              <a:rPr lang="en-US" sz="2200" b="1" dirty="0" smtClean="0">
+                <a:solidFill>
+                  <a:srgbClr val="FF0000"/>
+                </a:solidFill>
+              </a:rPr>
               <a:t>floating-point 64bit</a:t>
             </a:r>
-            <a:endParaRPr lang="bg-BG" sz="2200" dirty="0" smtClean="0"/>
+            <a:endParaRPr lang="bg-BG" sz="2200" b="1" dirty="0" smtClean="0">
+              <a:solidFill>
+                <a:srgbClr val="FF0000"/>
+              </a:solidFill>
+            </a:endParaRPr>
           </a:p>
           <a:p>
             <a:pPr lvl="2" indent="0">
@@ -30373,19 +31016,11 @@
             </a:pPr>
             <a:r>
               <a:rPr lang="en-US" sz="2200" dirty="0" smtClean="0"/>
-              <a:t>| 0 </a:t>
-            </a:r>
-            <a:r>
-              <a:rPr lang="en-US" sz="2200" dirty="0" smtClean="0"/>
-              <a:t>– </a:t>
+              <a:t>| 0 – </a:t>
             </a:r>
             <a:r>
               <a:rPr lang="bg-BG" sz="2200" dirty="0" smtClean="0"/>
-              <a:t>конвертиране </a:t>
-            </a:r>
-            <a:r>
-              <a:rPr lang="bg-BG" sz="2200" dirty="0" smtClean="0"/>
-              <a:t>на низ до число</a:t>
+              <a:t>конвертиране на низ до число</a:t>
             </a:r>
             <a:endParaRPr lang="en-US" sz="2200" dirty="0" smtClean="0"/>
           </a:p>
@@ -30397,6 +31032,20 @@
             <a:r>
               <a:rPr lang="en-US" sz="2200" dirty="0" err="1" smtClean="0"/>
               <a:t>toString</a:t>
+            </a:r>
+            <a:r>
+              <a:rPr lang="en-US" sz="2200" dirty="0" smtClean="0"/>
+              <a:t>()</a:t>
+            </a:r>
+          </a:p>
+          <a:p>
+            <a:pPr marL="522900" lvl="2" indent="-342900">
+              <a:buFont typeface="Wingdings" panose="05000000000000000000" pitchFamily="2" charset="2"/>
+              <a:buChar char="ü"/>
+            </a:pPr>
+            <a:r>
+              <a:rPr lang="en-US" sz="2200" dirty="0" err="1" smtClean="0"/>
+              <a:t>parseInt</a:t>
             </a:r>
             <a:r>
               <a:rPr lang="en-US" sz="2200" dirty="0" smtClean="0"/>
@@ -30411,11 +31060,11 @@
   <p:clrMapOvr>
     <a:masterClrMapping/>
   </p:clrMapOvr>
-  <p:transition xmlns:p14="http://schemas.microsoft.com/office/powerpoint/2010/main" spd="med"/>
+  <p:transition spd="med"/>
   <p:timing>
     <p:tnLst>
       <p:par>
-        <p:cTn xmlns:p14="http://schemas.microsoft.com/office/powerpoint/2010/main" id="1" dur="indefinite" restart="never" nodeType="tmRoot">
+        <p:cTn id="1" dur="indefinite" restart="never" nodeType="tmRoot">
           <p:childTnLst>
             <p:seq concurrent="1" nextAc="seek">
               <p:cTn id="2" dur="indefinite" nodeType="mainSeq">
@@ -30847,6 +31496,49 @@
                                           <p:spTgt spid="3">
                                             <p:txEl>
                                               <p:pRg st="10" end="10"/>
+                                            </p:txEl>
+                                          </p:spTgt>
+                                        </p:tgtEl>
+                                      </p:cBhvr>
+                                    </p:animEffect>
+                                  </p:childTnLst>
+                                </p:cTn>
+                              </p:par>
+                              <p:par>
+                                <p:cTn id="36" presetID="10" presetClass="entr" presetSubtype="0" fill="hold" nodeType="withEffect">
+                                  <p:stCondLst>
+                                    <p:cond delay="0"/>
+                                  </p:stCondLst>
+                                  <p:childTnLst>
+                                    <p:set>
+                                      <p:cBhvr>
+                                        <p:cTn id="37" dur="1" fill="hold">
+                                          <p:stCondLst>
+                                            <p:cond delay="0"/>
+                                          </p:stCondLst>
+                                        </p:cTn>
+                                        <p:tgtEl>
+                                          <p:spTgt spid="3">
+                                            <p:txEl>
+                                              <p:pRg st="11" end="11"/>
+                                            </p:txEl>
+                                          </p:spTgt>
+                                        </p:tgtEl>
+                                        <p:attrNameLst>
+                                          <p:attrName>style.visibility</p:attrName>
+                                        </p:attrNameLst>
+                                      </p:cBhvr>
+                                      <p:to>
+                                        <p:strVal val="visible"/>
+                                      </p:to>
+                                    </p:set>
+                                    <p:animEffect transition="in" filter="fade">
+                                      <p:cBhvr>
+                                        <p:cTn id="38" dur="500"/>
+                                        <p:tgtEl>
+                                          <p:spTgt spid="3">
+                                            <p:txEl>
+                                              <p:pRg st="11" end="11"/>
                                             </p:txEl>
                                           </p:spTgt>
                                         </p:tgtEl>
@@ -31139,11 +31831,11 @@
   <p:clrMapOvr>
     <a:masterClrMapping/>
   </p:clrMapOvr>
-  <p:transition xmlns:p14="http://schemas.microsoft.com/office/powerpoint/2010/main" spd="med"/>
+  <p:transition spd="med"/>
   <p:timing>
     <p:tnLst>
       <p:par>
-        <p:cTn xmlns:p14="http://schemas.microsoft.com/office/powerpoint/2010/main" id="1" dur="indefinite" restart="never" nodeType="tmRoot">
+        <p:cTn id="1" dur="indefinite" restart="never" nodeType="tmRoot">
           <p:childTnLst>
             <p:seq concurrent="1" nextAc="seek">
               <p:cTn id="2" dur="indefinite" nodeType="mainSeq">
@@ -31703,7 +32395,7 @@
           </a:prstGeom>
           <a:noFill/>
           <a:extLst>
-            <a:ext uri="{909E8E84-426E-40dd-AFC4-6F175D3DCCD1}">
+            <a:ext uri="{909E8E84-426E-40DD-AFC4-6F175D3DCCD1}">
               <a14:hiddenFill xmlns:a14="http://schemas.microsoft.com/office/drawing/2010/main">
                 <a:solidFill>
                   <a:srgbClr val="FFFFFF"/>
@@ -31935,6 +32627,47 @@
           </a:p>
         </p:txBody>
       </p:sp>
+      <p:pic>
+        <p:nvPicPr>
+          <p:cNvPr id="12" name="Picture 5" descr="C:\Users\i309691\Downloads\equipmentprotection3.png"/>
+          <p:cNvPicPr>
+            <a:picLocks noChangeAspect="1" noChangeArrowheads="1"/>
+          </p:cNvPicPr>
+          <p:nvPr/>
+        </p:nvPicPr>
+        <p:blipFill>
+          <a:blip r:embed="rId5" cstate="print">
+            <a:extLst>
+              <a:ext uri="{28A0092B-C50C-407E-A947-70E740481C1C}">
+                <a14:useLocalDpi xmlns:a14="http://schemas.microsoft.com/office/drawing/2010/main" val="0"/>
+              </a:ext>
+            </a:extLst>
+          </a:blip>
+          <a:srcRect/>
+          <a:stretch>
+            <a:fillRect/>
+          </a:stretch>
+        </p:blipFill>
+        <p:spPr bwMode="auto">
+          <a:xfrm>
+            <a:off x="523326" y="334752"/>
+            <a:ext cx="1639874" cy="1639874"/>
+          </a:xfrm>
+          <a:prstGeom prst="rect">
+            <a:avLst/>
+          </a:prstGeom>
+          <a:noFill/>
+          <a:extLst>
+            <a:ext uri="{909E8E84-426E-40DD-AFC4-6F175D3DCCD1}">
+              <a14:hiddenFill xmlns:a14="http://schemas.microsoft.com/office/drawing/2010/main">
+                <a:solidFill>
+                  <a:srgbClr val="FFFFFF"/>
+                </a:solidFill>
+              </a14:hiddenFill>
+            </a:ext>
+          </a:extLst>
+        </p:spPr>
+      </p:pic>
     </p:spTree>
     <p:extLst>
       <p:ext uri="{BB962C8B-B14F-4D97-AF65-F5344CB8AC3E}">
@@ -31948,7 +32681,7 @@
   <p:timing>
     <p:tnLst>
       <p:par>
-        <p:cTn xmlns:p14="http://schemas.microsoft.com/office/powerpoint/2010/main" id="1" dur="indefinite" restart="never" nodeType="tmRoot"/>
+        <p:cTn id="1" dur="indefinite" restart="never" nodeType="tmRoot"/>
       </p:par>
     </p:tnLst>
   </p:timing>
@@ -32113,11 +32846,7 @@
             </a:r>
             <a:r>
               <a:rPr lang="en-US" dirty="0" smtClean="0"/>
-              <a:t> </a:t>
-            </a:r>
-            <a:r>
-              <a:rPr lang="en-US" dirty="0" smtClean="0"/>
-              <a:t>values </a:t>
+              <a:t> values </a:t>
             </a:r>
             <a:endParaRPr lang="en-US" dirty="0"/>
           </a:p>
@@ -32161,7 +32890,48 @@
           </a:prstGeom>
           <a:noFill/>
           <a:extLst>
-            <a:ext uri="{909E8E84-426E-40dd-AFC4-6F175D3DCCD1}">
+            <a:ext uri="{909E8E84-426E-40DD-AFC4-6F175D3DCCD1}">
+              <a14:hiddenFill xmlns:a14="http://schemas.microsoft.com/office/drawing/2010/main">
+                <a:solidFill>
+                  <a:srgbClr val="FFFFFF"/>
+                </a:solidFill>
+              </a14:hiddenFill>
+            </a:ext>
+          </a:extLst>
+        </p:spPr>
+      </p:pic>
+      <p:pic>
+        <p:nvPicPr>
+          <p:cNvPr id="4098" name="Picture 2" descr="http://devcentral.f5.com/weblogs/images/devcentral_f5_com/weblogs/Joe/WindowsLiveWriter/PowerShellABCsAisforArithmeticOperators_CEC8/math%20symbols_2.jpg"/>
+          <p:cNvPicPr>
+            <a:picLocks noChangeAspect="1" noChangeArrowheads="1"/>
+          </p:cNvPicPr>
+          <p:nvPr/>
+        </p:nvPicPr>
+        <p:blipFill>
+          <a:blip r:embed="rId3" cstate="print">
+            <a:extLst>
+              <a:ext uri="{28A0092B-C50C-407E-A947-70E740481C1C}">
+                <a14:useLocalDpi xmlns:a14="http://schemas.microsoft.com/office/drawing/2010/main" val="0"/>
+              </a:ext>
+            </a:extLst>
+          </a:blip>
+          <a:srcRect/>
+          <a:stretch>
+            <a:fillRect/>
+          </a:stretch>
+        </p:blipFill>
+        <p:spPr bwMode="auto">
+          <a:xfrm>
+            <a:off x="4849722" y="3270368"/>
+            <a:ext cx="2949298" cy="2450301"/>
+          </a:xfrm>
+          <a:prstGeom prst="rect">
+            <a:avLst/>
+          </a:prstGeom>
+          <a:noFill/>
+          <a:extLst>
+            <a:ext uri="{909E8E84-426E-40DD-AFC4-6F175D3DCCD1}">
               <a14:hiddenFill xmlns:a14="http://schemas.microsoft.com/office/drawing/2010/main">
                 <a:solidFill>
                   <a:srgbClr val="FFFFFF"/>
@@ -32184,7 +32954,7 @@
   <p:timing>
     <p:tnLst>
       <p:par>
-        <p:cTn xmlns:p14="http://schemas.microsoft.com/office/powerpoint/2010/main" id="1" dur="indefinite" restart="never" nodeType="tmRoot"/>
+        <p:cTn id="1" dur="indefinite" restart="never" nodeType="tmRoot"/>
       </p:par>
     </p:tnLst>
   </p:timing>

</xml_diff>